<commit_message>
mirgrating from rest to graphql
</commit_message>
<xml_diff>
--- a/GraphQL.pptx
+++ b/GraphQL.pptx
@@ -17,6 +17,7 @@
     <p:sldId id="265" r:id="rId11"/>
     <p:sldId id="266" r:id="rId12"/>
     <p:sldId id="267" r:id="rId13"/>
+    <p:sldId id="268" r:id="rId14"/>
   </p:sldIdLst>
   <p:sldSz cx="12192000" cy="6858000"/>
   <p:notesSz cx="6858000" cy="9144000"/>
@@ -3855,6 +3856,146 @@
     <p:extLst>
       <p:ext uri="{BB962C8B-B14F-4D97-AF65-F5344CB8AC3E}">
         <p14:creationId xmlns:p14="http://schemas.microsoft.com/office/powerpoint/2010/main" val="3999994953"/>
+      </p:ext>
+    </p:extLst>
+  </p:cSld>
+  <p:clrMapOvr>
+    <a:masterClrMapping/>
+  </p:clrMapOvr>
+</p:sld>
+</file>
+
+<file path=ppt/slides/slide13.xml><?xml version="1.0" encoding="utf-8"?>
+<p:sld xmlns:a="http://schemas.openxmlformats.org/drawingml/2006/main" xmlns:r="http://schemas.openxmlformats.org/officeDocument/2006/relationships" xmlns:p="http://schemas.openxmlformats.org/presentationml/2006/main">
+  <p:cSld>
+    <p:spTree>
+      <p:nvGrpSpPr>
+        <p:cNvPr id="1" name=""/>
+        <p:cNvGrpSpPr/>
+        <p:nvPr/>
+      </p:nvGrpSpPr>
+      <p:grpSpPr>
+        <a:xfrm>
+          <a:off x="0" y="0"/>
+          <a:ext cx="0" cy="0"/>
+          <a:chOff x="0" y="0"/>
+          <a:chExt cx="0" cy="0"/>
+        </a:xfrm>
+      </p:grpSpPr>
+      <p:sp>
+        <p:nvSpPr>
+          <p:cNvPr id="2" name="제목 1">
+            <a:extLst>
+              <a:ext uri="{FF2B5EF4-FFF2-40B4-BE49-F238E27FC236}">
+                <a16:creationId xmlns:a16="http://schemas.microsoft.com/office/drawing/2014/main" id="{BB97BFB8-6852-93BB-4FA0-FFD852E5CC1E}"/>
+              </a:ext>
+            </a:extLst>
+          </p:cNvPr>
+          <p:cNvSpPr>
+            <a:spLocks noGrp="1"/>
+          </p:cNvSpPr>
+          <p:nvPr>
+            <p:ph type="title"/>
+          </p:nvPr>
+        </p:nvSpPr>
+        <p:spPr/>
+        <p:txBody>
+          <a:bodyPr/>
+          <a:lstStyle/>
+          <a:p>
+            <a:r>
+              <a:rPr lang="en-US" dirty="0"/>
+              <a:t>Doc string</a:t>
+            </a:r>
+          </a:p>
+        </p:txBody>
+      </p:sp>
+      <p:sp>
+        <p:nvSpPr>
+          <p:cNvPr id="3" name="내용 개체 틀 2">
+            <a:extLst>
+              <a:ext uri="{FF2B5EF4-FFF2-40B4-BE49-F238E27FC236}">
+                <a16:creationId xmlns:a16="http://schemas.microsoft.com/office/drawing/2014/main" id="{07CFD597-B377-5700-A306-CEFE40125148}"/>
+              </a:ext>
+            </a:extLst>
+          </p:cNvPr>
+          <p:cNvSpPr>
+            <a:spLocks noGrp="1"/>
+          </p:cNvSpPr>
+          <p:nvPr>
+            <p:ph idx="1"/>
+          </p:nvPr>
+        </p:nvSpPr>
+        <p:spPr/>
+        <p:txBody>
+          <a:bodyPr/>
+          <a:lstStyle/>
+          <a:p>
+            <a:r>
+              <a:rPr lang="en-US" dirty="0"/>
+              <a:t>Type, field</a:t>
+            </a:r>
+            <a:r>
+              <a:rPr lang="ko-KR" altLang="en-US" dirty="0"/>
+              <a:t>또는 </a:t>
+            </a:r>
+            <a:r>
+              <a:rPr lang="en-US" altLang="ko-KR" dirty="0" err="1"/>
+              <a:t>argumen</a:t>
+            </a:r>
+            <a:r>
+              <a:rPr lang="ko-KR" altLang="en-US" dirty="0"/>
+              <a:t>에 대한 설명을 덧붙일 수 있다</a:t>
+            </a:r>
+            <a:r>
+              <a:rPr lang="en-US" altLang="ko-KR" dirty="0"/>
+              <a:t>. Documentation</a:t>
+            </a:r>
+            <a:r>
+              <a:rPr lang="ko-KR" altLang="en-US" dirty="0"/>
+              <a:t>을 작성하는데 매우 도움이 된다</a:t>
+            </a:r>
+            <a:endParaRPr lang="en-US" altLang="ko-KR" dirty="0"/>
+          </a:p>
+          <a:p>
+            <a:endParaRPr lang="en-US" dirty="0"/>
+          </a:p>
+        </p:txBody>
+      </p:sp>
+      <p:pic>
+        <p:nvPicPr>
+          <p:cNvPr id="5" name="그림 4">
+            <a:extLst>
+              <a:ext uri="{FF2B5EF4-FFF2-40B4-BE49-F238E27FC236}">
+                <a16:creationId xmlns:a16="http://schemas.microsoft.com/office/drawing/2014/main" id="{C4A72452-BB22-61A9-6AA5-17FF91CCAB6D}"/>
+              </a:ext>
+            </a:extLst>
+          </p:cNvPr>
+          <p:cNvPicPr>
+            <a:picLocks noChangeAspect="1"/>
+          </p:cNvPicPr>
+          <p:nvPr/>
+        </p:nvPicPr>
+        <p:blipFill>
+          <a:blip r:embed="rId2"/>
+          <a:stretch>
+            <a:fillRect/>
+          </a:stretch>
+        </p:blipFill>
+        <p:spPr>
+          <a:xfrm>
+            <a:off x="1071799" y="3005078"/>
+            <a:ext cx="3505689" cy="847843"/>
+          </a:xfrm>
+          <a:prstGeom prst="rect">
+            <a:avLst/>
+          </a:prstGeom>
+        </p:spPr>
+      </p:pic>
+    </p:spTree>
+    <p:extLst>
+      <p:ext uri="{BB962C8B-B14F-4D97-AF65-F5344CB8AC3E}">
+        <p14:creationId xmlns:p14="http://schemas.microsoft.com/office/powerpoint/2010/main" val="1752020663"/>
       </p:ext>
     </p:extLst>
   </p:cSld>

</xml_diff>